<commit_message>
On demand wait time report
</commit_message>
<xml_diff>
--- a/template_waitTime.pptx
+++ b/template_waitTime.pptx
@@ -213,7 +213,7 @@
           <a:p>
             <a:fld id="{145C5907-4029-4547-AD2B-4B63D620982F}" type="datetimeFigureOut">
               <a:rPr lang="en-US" smtClean="0"/>
-              <a:t>5/23/2022</a:t>
+              <a:t>7/6/2022</a:t>
             </a:fld>
             <a:endParaRPr lang="en-US"/>
           </a:p>
@@ -1041,8 +1041,8 @@
         </p:nvSpPr>
         <p:spPr>
           <a:xfrm>
-            <a:off x="169688" y="879633"/>
-            <a:ext cx="5207608" cy="4090575"/>
+            <a:off x="0" y="879633"/>
+            <a:ext cx="5558246" cy="4090575"/>
           </a:xfrm>
         </p:spPr>
         <p:txBody>
@@ -1065,8 +1065,8 @@
         </p:nvSpPr>
         <p:spPr>
           <a:xfrm>
-            <a:off x="5392882" y="1267930"/>
-            <a:ext cx="3505112" cy="3702276"/>
+            <a:off x="5558246" y="1267930"/>
+            <a:ext cx="3585754" cy="3702276"/>
           </a:xfrm>
         </p:spPr>
         <p:txBody>
@@ -1089,8 +1089,8 @@
         </p:nvSpPr>
         <p:spPr>
           <a:xfrm>
-            <a:off x="169688" y="5206181"/>
-            <a:ext cx="8728306" cy="1150173"/>
+            <a:off x="169687" y="5179423"/>
+            <a:ext cx="8974311" cy="1176932"/>
           </a:xfrm>
         </p:spPr>
         <p:txBody>
@@ -1123,8 +1123,8 @@
         </p:nvSpPr>
         <p:spPr>
           <a:xfrm>
-            <a:off x="5392341" y="879476"/>
-            <a:ext cx="3505200" cy="366666"/>
+            <a:off x="5558246" y="879476"/>
+            <a:ext cx="3585753" cy="366666"/>
           </a:xfrm>
         </p:spPr>
         <p:txBody>
@@ -1162,7 +1162,7 @@
         <p:spPr>
           <a:xfrm>
             <a:off x="169688" y="6356347"/>
-            <a:ext cx="6383512" cy="365125"/>
+            <a:ext cx="8517112" cy="365125"/>
           </a:xfrm>
           <a:prstGeom prst="rect">
             <a:avLst/>
@@ -1320,8 +1320,8 @@
         </p:nvSpPr>
         <p:spPr>
           <a:xfrm>
-            <a:off x="169688" y="879631"/>
-            <a:ext cx="4320540" cy="4205128"/>
+            <a:off x="0" y="879631"/>
+            <a:ext cx="4490228" cy="4205128"/>
           </a:xfrm>
         </p:spPr>
         <p:txBody>
@@ -1344,8 +1344,8 @@
         </p:nvSpPr>
         <p:spPr>
           <a:xfrm>
-            <a:off x="4522901" y="879633"/>
-            <a:ext cx="4320540" cy="4205129"/>
+            <a:off x="4490228" y="879633"/>
+            <a:ext cx="4653771" cy="4205129"/>
           </a:xfrm>
         </p:spPr>
         <p:txBody>
@@ -1368,8 +1368,8 @@
         </p:nvSpPr>
         <p:spPr>
           <a:xfrm>
-            <a:off x="169688" y="5206181"/>
-            <a:ext cx="8673754" cy="1150173"/>
+            <a:off x="169687" y="5084763"/>
+            <a:ext cx="8974311" cy="1271592"/>
           </a:xfrm>
         </p:spPr>
         <p:txBody>
@@ -1403,7 +1403,7 @@
         <p:spPr>
           <a:xfrm>
             <a:off x="169688" y="6356347"/>
-            <a:ext cx="6383512" cy="365125"/>
+            <a:ext cx="8517112" cy="365125"/>
           </a:xfrm>
           <a:prstGeom prst="rect">
             <a:avLst/>
@@ -1620,7 +1620,7 @@
         <p:spPr>
           <a:xfrm>
             <a:off x="169688" y="6356347"/>
-            <a:ext cx="6383512" cy="365125"/>
+            <a:ext cx="8517112" cy="365125"/>
           </a:xfrm>
           <a:prstGeom prst="rect">
             <a:avLst/>

</xml_diff>